<commit_message>
Apresentação, Analise de Resultados,Conclusão
</commit_message>
<xml_diff>
--- a/Project/Phase II/IC - Phase_II.pptx
+++ b/Project/Phase II/IC - Phase_II.pptx
@@ -16547,7 +16547,157 @@
             <a:pPr>
               <a:defRPr/>
             </a:pPr>
-            <a:endParaRPr lang="pt-PT"/>
+            <a:r>
+              <a:rPr lang="pt-PT" sz="2000" b="0" i="0" u="none" strike="noStrike" cap="none" spc="0">
+                <a:solidFill>
+                  <a:schemeClr val="tx1"/>
+                </a:solidFill>
+                <a:latin typeface="Arial"/>
+                <a:cs typeface="Arial"/>
+              </a:rPr>
+              <a:t>Podemos observar pelos gráficos acima que os valores </a:t>
+            </a:r>
+            <a:r>
+              <a:rPr lang="pt-PT" sz="2000" b="0" i="0" u="none" strike="noStrike" cap="none" spc="0">
+                <a:solidFill>
+                  <a:schemeClr val="tx1"/>
+                </a:solidFill>
+                <a:latin typeface="Arial"/>
+                <a:cs typeface="Arial"/>
+              </a:rPr>
+              <a:t>obtidos pelo algoritmo PSO são melhores </a:t>
+            </a:r>
+            <a:r>
+              <a:rPr lang="pt-PT" sz="2000" b="0" i="0" u="none" strike="noStrike" cap="none" spc="0">
+                <a:solidFill>
+                  <a:schemeClr val="tx1"/>
+                </a:solidFill>
+                <a:latin typeface="Arial"/>
+                <a:cs typeface="Arial"/>
+              </a:rPr>
+              <a:t>(menor custo) em quase tudo para este caso de problema.</a:t>
+            </a:r>
+            <a:r>
+              <a:rPr lang="pt-PT" sz="2000" b="0" i="0" u="none" strike="noStrike" cap="none" spc="0">
+                <a:solidFill>
+                  <a:schemeClr val="tx1"/>
+                </a:solidFill>
+                <a:latin typeface="Arial"/>
+                <a:cs typeface="Arial"/>
+              </a:rPr>
+              <a:t>O único custo que se destacou de FA foi em dimensão 3 em Ackley </a:t>
+            </a:r>
+            <a:r>
+              <a:rPr lang="pt-PT" sz="2000" b="0" i="0" u="none" strike="noStrike" cap="none" spc="0">
+                <a:solidFill>
+                  <a:schemeClr val="tx1"/>
+                </a:solidFill>
+                <a:latin typeface="Arial"/>
+                <a:cs typeface="Arial"/>
+              </a:rPr>
+              <a:t>em que obtivemos valores negativos no custo.</a:t>
+            </a:r>
+            <a:endParaRPr lang="pt-PT" sz="2000" b="0" i="0" u="none" strike="noStrike" cap="none" spc="0">
+              <a:solidFill>
+                <a:schemeClr val="tx1"/>
+              </a:solidFill>
+              <a:latin typeface="Arial"/>
+              <a:cs typeface="Arial"/>
+            </a:endParaRPr>
+          </a:p>
+          <a:p>
+            <a:pPr>
+              <a:defRPr/>
+            </a:pPr>
+            <a:r>
+              <a:rPr lang="pt-PT" sz="2000" b="0" i="0" u="none" strike="noStrike" cap="none" spc="0">
+                <a:solidFill>
+                  <a:schemeClr val="tx1"/>
+                </a:solidFill>
+                <a:latin typeface="Arial"/>
+                <a:cs typeface="Arial"/>
+              </a:rPr>
+              <a:t>Apesar de nas pequisas que efetuamos já muitos casos </a:t>
+            </a:r>
+            <a:r>
+              <a:rPr lang="pt-PT" sz="2000" b="0" i="0" u="none" strike="noStrike" cap="none" spc="0">
+                <a:solidFill>
+                  <a:schemeClr val="tx1"/>
+                </a:solidFill>
+                <a:latin typeface="Arial"/>
+                <a:cs typeface="Arial"/>
+              </a:rPr>
+              <a:t>se verificam que o FA é um algoritmo que traz melhores resultados </a:t>
+            </a:r>
+            <a:r>
+              <a:rPr lang="pt-PT" sz="2000" b="0" i="0" u="none" strike="noStrike" cap="none" spc="0">
+                <a:solidFill>
+                  <a:schemeClr val="tx1"/>
+                </a:solidFill>
+                <a:latin typeface="Arial"/>
+                <a:cs typeface="Arial"/>
+              </a:rPr>
+              <a:t>em curto tempo e que já existem versões modificadas para </a:t>
+            </a:r>
+            <a:r>
+              <a:rPr lang="pt-PT" sz="2000" b="0" i="0" u="none" strike="noStrike" cap="none" spc="0">
+                <a:solidFill>
+                  <a:schemeClr val="tx1"/>
+                </a:solidFill>
+                <a:latin typeface="Arial"/>
+                <a:cs typeface="Arial"/>
+              </a:rPr>
+              <a:t>dar mais liberdade ainda ao algoritmo.</a:t>
+            </a:r>
+            <a:endParaRPr lang="pt-PT" sz="2000" b="0" i="0" u="none" strike="noStrike" cap="none" spc="0">
+              <a:solidFill>
+                <a:schemeClr val="tx1"/>
+              </a:solidFill>
+              <a:latin typeface="Arial"/>
+              <a:cs typeface="Arial"/>
+            </a:endParaRPr>
+          </a:p>
+          <a:p>
+            <a:pPr>
+              <a:defRPr/>
+            </a:pPr>
+            <a:r>
+              <a:rPr lang="pt-PT" sz="2000" b="0" i="0" u="none" strike="noStrike" cap="none" spc="0">
+                <a:solidFill>
+                  <a:schemeClr val="tx1"/>
+                </a:solidFill>
+                <a:latin typeface="Arial"/>
+                <a:cs typeface="Arial"/>
+              </a:rPr>
+              <a:t>Esperemos com este relatório percebe-se como Firefly </a:t>
+            </a:r>
+            <a:r>
+              <a:rPr lang="pt-PT" sz="2000" b="0" i="0" u="none" strike="noStrike" cap="none" spc="0">
+                <a:solidFill>
+                  <a:schemeClr val="tx1"/>
+                </a:solidFill>
+                <a:latin typeface="Arial"/>
+                <a:cs typeface="Arial"/>
+              </a:rPr>
+              <a:t>Algorithm funcione, e utilizações que possa ter para resolver </a:t>
+            </a:r>
+            <a:r>
+              <a:rPr lang="pt-PT" sz="2000" b="0" i="0" u="none" strike="noStrike" cap="none" spc="0">
+                <a:solidFill>
+                  <a:schemeClr val="tx1"/>
+                </a:solidFill>
+                <a:latin typeface="Arial"/>
+                <a:cs typeface="Arial"/>
+              </a:rPr>
+              <a:t>diversos problemas.</a:t>
+            </a:r>
+            <a:endParaRPr lang="pt-PT" sz="2000" b="0" i="0" u="none" strike="noStrike" cap="none" spc="0">
+              <a:solidFill>
+                <a:schemeClr val="tx1"/>
+              </a:solidFill>
+              <a:latin typeface="Arial"/>
+              <a:cs typeface="Arial"/>
+            </a:endParaRPr>
           </a:p>
         </p:txBody>
       </p:sp>

</xml_diff>